<commit_message>
Remove unused files and update presentation
Deleted temporary, backup, and image files from documentation and tutorial directories to clean up the repository. Updated the NTU Ride Pilot presentation file.
</commit_message>
<xml_diff>
--- a/NTU Ride Pilot/Documentation/Documentation/NTU Ride Pilot.pptx
+++ b/NTU Ride Pilot/Documentation/Documentation/NTU Ride Pilot.pptx
@@ -924,7 +924,7 @@
           <a:p>
             <a:fld id="{5BCAD085-E8A6-8845-BD4E-CB4CCA059FC4}" type="datetimeFigureOut">
               <a:rPr lang="en-US" smtClean="0"/>
-              <a:t>7/15/2025</a:t>
+              <a:t>7/27/2025</a:t>
             </a:fld>
             <a:endParaRPr lang="en-US"/>
           </a:p>
@@ -1175,7 +1175,7 @@
           <a:p>
             <a:fld id="{5BCAD085-E8A6-8845-BD4E-CB4CCA059FC4}" type="datetimeFigureOut">
               <a:rPr lang="en-US" smtClean="0"/>
-              <a:t>7/15/2025</a:t>
+              <a:t>7/27/2025</a:t>
             </a:fld>
             <a:endParaRPr lang="en-US"/>
           </a:p>
@@ -1489,7 +1489,7 @@
           <a:p>
             <a:fld id="{5BCAD085-E8A6-8845-BD4E-CB4CCA059FC4}" type="datetimeFigureOut">
               <a:rPr lang="en-US" smtClean="0"/>
-              <a:t>7/15/2025</a:t>
+              <a:t>7/27/2025</a:t>
             </a:fld>
             <a:endParaRPr lang="en-US"/>
           </a:p>
@@ -1822,7 +1822,7 @@
           <a:p>
             <a:fld id="{5BCAD085-E8A6-8845-BD4E-CB4CCA059FC4}" type="datetimeFigureOut">
               <a:rPr lang="en-US" smtClean="0"/>
-              <a:t>7/15/2025</a:t>
+              <a:t>7/27/2025</a:t>
             </a:fld>
             <a:endParaRPr lang="en-US"/>
           </a:p>
@@ -2136,7 +2136,7 @@
           <a:p>
             <a:fld id="{5BCAD085-E8A6-8845-BD4E-CB4CCA059FC4}" type="datetimeFigureOut">
               <a:rPr lang="en-US" smtClean="0"/>
-              <a:t>7/15/2025</a:t>
+              <a:t>7/27/2025</a:t>
             </a:fld>
             <a:endParaRPr lang="en-US"/>
           </a:p>
@@ -2529,7 +2529,7 @@
           <a:p>
             <a:fld id="{5BCAD085-E8A6-8845-BD4E-CB4CCA059FC4}" type="datetimeFigureOut">
               <a:rPr lang="en-US" smtClean="0"/>
-              <a:t>7/15/2025</a:t>
+              <a:t>7/27/2025</a:t>
             </a:fld>
             <a:endParaRPr lang="en-US"/>
           </a:p>
@@ -2699,7 +2699,7 @@
           <a:p>
             <a:fld id="{5BCAD085-E8A6-8845-BD4E-CB4CCA059FC4}" type="datetimeFigureOut">
               <a:rPr lang="en-US" smtClean="0"/>
-              <a:t>7/15/2025</a:t>
+              <a:t>7/27/2025</a:t>
             </a:fld>
             <a:endParaRPr lang="en-US"/>
           </a:p>
@@ -2879,7 +2879,7 @@
           <a:p>
             <a:fld id="{5BCAD085-E8A6-8845-BD4E-CB4CCA059FC4}" type="datetimeFigureOut">
               <a:rPr lang="en-US" smtClean="0"/>
-              <a:t>7/15/2025</a:t>
+              <a:t>7/27/2025</a:t>
             </a:fld>
             <a:endParaRPr lang="en-US"/>
           </a:p>
@@ -3049,7 +3049,7 @@
           <a:p>
             <a:fld id="{5BCAD085-E8A6-8845-BD4E-CB4CCA059FC4}" type="datetimeFigureOut">
               <a:rPr lang="en-US" smtClean="0"/>
-              <a:t>7/15/2025</a:t>
+              <a:t>7/27/2025</a:t>
             </a:fld>
             <a:endParaRPr lang="en-US"/>
           </a:p>
@@ -3296,7 +3296,7 @@
           <a:p>
             <a:fld id="{5BCAD085-E8A6-8845-BD4E-CB4CCA059FC4}" type="datetimeFigureOut">
               <a:rPr lang="en-US" smtClean="0"/>
-              <a:t>7/15/2025</a:t>
+              <a:t>7/27/2025</a:t>
             </a:fld>
             <a:endParaRPr lang="en-US"/>
           </a:p>
@@ -3593,7 +3593,7 @@
           <a:p>
             <a:fld id="{5BCAD085-E8A6-8845-BD4E-CB4CCA059FC4}" type="datetimeFigureOut">
               <a:rPr lang="en-US" smtClean="0"/>
-              <a:t>7/15/2025</a:t>
+              <a:t>7/27/2025</a:t>
             </a:fld>
             <a:endParaRPr lang="en-US"/>
           </a:p>
@@ -3972,7 +3972,7 @@
           <a:p>
             <a:fld id="{5BCAD085-E8A6-8845-BD4E-CB4CCA059FC4}" type="datetimeFigureOut">
               <a:rPr lang="en-US" smtClean="0"/>
-              <a:t>7/15/2025</a:t>
+              <a:t>7/27/2025</a:t>
             </a:fld>
             <a:endParaRPr lang="en-US"/>
           </a:p>
@@ -4095,7 +4095,7 @@
           <a:p>
             <a:fld id="{5BCAD085-E8A6-8845-BD4E-CB4CCA059FC4}" type="datetimeFigureOut">
               <a:rPr lang="en-US" smtClean="0"/>
-              <a:t>7/15/2025</a:t>
+              <a:t>7/27/2025</a:t>
             </a:fld>
             <a:endParaRPr lang="en-US"/>
           </a:p>
@@ -4190,7 +4190,7 @@
           <a:p>
             <a:fld id="{5BCAD085-E8A6-8845-BD4E-CB4CCA059FC4}" type="datetimeFigureOut">
               <a:rPr lang="en-US" smtClean="0"/>
-              <a:t>7/15/2025</a:t>
+              <a:t>7/27/2025</a:t>
             </a:fld>
             <a:endParaRPr lang="en-US"/>
           </a:p>
@@ -4445,7 +4445,7 @@
           <a:p>
             <a:fld id="{5BCAD085-E8A6-8845-BD4E-CB4CCA059FC4}" type="datetimeFigureOut">
               <a:rPr lang="en-US" smtClean="0"/>
-              <a:t>7/15/2025</a:t>
+              <a:t>7/27/2025</a:t>
             </a:fld>
             <a:endParaRPr lang="en-US"/>
           </a:p>
@@ -4708,7 +4708,7 @@
           <a:p>
             <a:fld id="{5BCAD085-E8A6-8845-BD4E-CB4CCA059FC4}" type="datetimeFigureOut">
               <a:rPr lang="en-US" smtClean="0"/>
-              <a:t>7/15/2025</a:t>
+              <a:t>7/27/2025</a:t>
             </a:fld>
             <a:endParaRPr lang="en-US"/>
           </a:p>
@@ -5522,7 +5522,7 @@
           <a:p>
             <a:fld id="{5BCAD085-E8A6-8845-BD4E-CB4CCA059FC4}" type="datetimeFigureOut">
               <a:rPr lang="en-US" smtClean="0"/>
-              <a:t>7/15/2025</a:t>
+              <a:t>7/27/2025</a:t>
             </a:fld>
             <a:endParaRPr lang="en-US"/>
           </a:p>
@@ -6124,7 +6124,7 @@
         </p:nvSpPr>
         <p:spPr>
           <a:xfrm>
-            <a:off x="3887950" y="1029753"/>
+            <a:off x="2748170" y="1056831"/>
             <a:ext cx="3191271" cy="2372168"/>
           </a:xfrm>
         </p:spPr>
@@ -6142,8 +6142,12 @@
               </a:defRPr>
             </a:pPr>
             <a:r>
+              <a:rPr lang="en-US" sz="3200" dirty="0" smtClean="0"/>
+              <a:t>Ride </a:t>
+            </a:r>
+            <a:r>
               <a:rPr lang="en-US" sz="3200" dirty="0"/>
-              <a:t>NTU Ride Pilot</a:t>
+              <a:t>Pilot</a:t>
             </a:r>
           </a:p>
         </p:txBody>
@@ -6183,22 +6187,38 @@
               <a:t>Presented by</a:t>
             </a:r>
             <a:r>
-              <a:rPr lang="en-US" dirty="0">
+              <a:rPr lang="en-US" dirty="0" smtClean="0">
                 <a:latin typeface="Times New Roman" panose="02020603050405020304" pitchFamily="18" charset="0"/>
                 <a:cs typeface="Times New Roman" panose="02020603050405020304" pitchFamily="18" charset="0"/>
               </a:rPr>
               <a:t>: </a:t>
             </a:r>
             <a:r>
-              <a:rPr lang="en-US" b="1" dirty="0">
+              <a:rPr lang="en-US" b="1" dirty="0" smtClean="0">
                 <a:latin typeface="Times New Roman" panose="02020603050405020304" pitchFamily="18" charset="0"/>
                 <a:ea typeface="ADLaM Display" panose="020F0502020204030204" pitchFamily="2" charset="0"/>
                 <a:cs typeface="Times New Roman" panose="02020603050405020304" pitchFamily="18" charset="0"/>
               </a:rPr>
-              <a:t>Abubakar Nadeem, Imran Ali Niaz, </a:t>
-            </a:r>
-            <a:r>
-              <a:rPr lang="en-US" b="1" dirty="0" err="1">
+              <a:t>Abubakar Nadeem, Imran Ali </a:t>
+            </a:r>
+            <a:r>
+              <a:rPr lang="en-US" b="1" dirty="0" err="1" smtClean="0">
+                <a:latin typeface="Times New Roman" panose="02020603050405020304" pitchFamily="18" charset="0"/>
+                <a:ea typeface="ADLaM Display" panose="020F0502020204030204" pitchFamily="2" charset="0"/>
+                <a:cs typeface="Times New Roman" panose="02020603050405020304" pitchFamily="18" charset="0"/>
+              </a:rPr>
+              <a:t>Niaz</a:t>
+            </a:r>
+            <a:r>
+              <a:rPr lang="en-US" b="1" dirty="0" smtClean="0">
+                <a:latin typeface="Times New Roman" panose="02020603050405020304" pitchFamily="18" charset="0"/>
+                <a:ea typeface="ADLaM Display" panose="020F0502020204030204" pitchFamily="2" charset="0"/>
+                <a:cs typeface="Times New Roman" panose="02020603050405020304" pitchFamily="18" charset="0"/>
+              </a:rPr>
+              <a:t>, </a:t>
+            </a:r>
+            <a:r>
+              <a:rPr lang="en-US" b="1" dirty="0" err="1" smtClean="0">
                 <a:latin typeface="Times New Roman" panose="02020603050405020304" pitchFamily="18" charset="0"/>
                 <a:ea typeface="ADLaM Display" panose="020F0502020204030204" pitchFamily="2" charset="0"/>
                 <a:cs typeface="Times New Roman" panose="02020603050405020304" pitchFamily="18" charset="0"/>
@@ -6206,20 +6226,12 @@
               <a:t>Huzaifa</a:t>
             </a:r>
             <a:r>
-              <a:rPr lang="en-US" b="1" dirty="0">
-                <a:latin typeface="Times New Roman" panose="02020603050405020304" pitchFamily="18" charset="0"/>
-                <a:ea typeface="ADLaM Display" panose="020F0502020204030204" pitchFamily="2" charset="0"/>
-                <a:cs typeface="Times New Roman" panose="02020603050405020304" pitchFamily="18" charset="0"/>
-              </a:rPr>
-              <a:t> </a:t>
-            </a:r>
-            <a:r>
               <a:rPr lang="en-US" b="1" dirty="0" smtClean="0">
                 <a:latin typeface="Times New Roman" panose="02020603050405020304" pitchFamily="18" charset="0"/>
                 <a:ea typeface="ADLaM Display" panose="020F0502020204030204" pitchFamily="2" charset="0"/>
                 <a:cs typeface="Times New Roman" panose="02020603050405020304" pitchFamily="18" charset="0"/>
               </a:rPr>
-              <a:t>Ahmad</a:t>
+              <a:t> Ahmad</a:t>
             </a:r>
           </a:p>
           <a:p>
@@ -6228,7 +6240,7 @@
                 <a:spcPct val="90000"/>
               </a:lnSpc>
             </a:pPr>
-            <a:endParaRPr lang="en-US" b="1" dirty="0">
+            <a:endParaRPr lang="en-US" b="1" dirty="0" smtClean="0">
               <a:latin typeface="Times New Roman" panose="02020603050405020304" pitchFamily="18" charset="0"/>
               <a:ea typeface="ADLaM Display" panose="020F0502020204030204" pitchFamily="2" charset="0"/>
               <a:cs typeface="Times New Roman" panose="02020603050405020304" pitchFamily="18" charset="0"/>
@@ -6241,11 +6253,18 @@
               </a:lnSpc>
             </a:pPr>
             <a:r>
+              <a:rPr lang="en-US" b="1" dirty="0" smtClean="0">
+                <a:latin typeface="Times New Roman" panose="02020603050405020304" pitchFamily="18" charset="0"/>
+                <a:cs typeface="Times New Roman" panose="02020603050405020304" pitchFamily="18" charset="0"/>
+              </a:rPr>
+              <a:t>     </a:t>
+            </a:r>
+            <a:r>
               <a:rPr lang="en-US" b="1" dirty="0">
                 <a:latin typeface="Times New Roman" panose="02020603050405020304" pitchFamily="18" charset="0"/>
                 <a:cs typeface="Times New Roman" panose="02020603050405020304" pitchFamily="18" charset="0"/>
               </a:rPr>
-              <a:t>     Supervised by</a:t>
+              <a:t>Supervised by</a:t>
             </a:r>
             <a:r>
               <a:rPr lang="en-US" dirty="0">
@@ -7889,8 +7908,12 @@
               <a:defRPr sz="1800"/>
             </a:pPr>
             <a:r>
-              <a:rPr lang="en-US" sz="1900"/>
-              <a:t>NTU Ride Pilot is a smart transport management system</a:t>
+              <a:rPr lang="en-US" sz="1900" dirty="0" smtClean="0"/>
+              <a:t>Ride </a:t>
+            </a:r>
+            <a:r>
+              <a:rPr lang="en-US" sz="1900" dirty="0"/>
+              <a:t>Pilot is a smart transport management system</a:t>
             </a:r>
           </a:p>
           <a:p>
@@ -7898,7 +7921,7 @@
               <a:defRPr sz="1800"/>
             </a:pPr>
             <a:r>
-              <a:rPr lang="en-US" sz="1900"/>
+              <a:rPr lang="en-US" sz="1900" dirty="0"/>
               <a:t>Ensures safety, efficiency, and real-time control</a:t>
             </a:r>
           </a:p>
@@ -7907,7 +7930,7 @@
               <a:defRPr sz="1800"/>
             </a:pPr>
             <a:r>
-              <a:rPr lang="en-US" sz="1900"/>
+              <a:rPr lang="en-US" sz="1900" dirty="0"/>
               <a:t>Addresses real campus transport problems</a:t>
             </a:r>
           </a:p>
@@ -7916,7 +7939,7 @@
               <a:defRPr sz="1800"/>
             </a:pPr>
             <a:r>
-              <a:rPr lang="en-US" sz="1900"/>
+              <a:rPr lang="en-US" sz="1900" dirty="0"/>
               <a:t>Ready for deployment and future upgrades</a:t>
             </a:r>
           </a:p>

</xml_diff>